<commit_message>
Set Operations (Distinct, DistinctBy)
</commit_message>
<xml_diff>
--- a/Linq.pptx
+++ b/Linq.pptx
@@ -114,6 +114,11 @@
       </a:defRPr>
     </a:lvl9pPr>
   </p:defaultTextStyle>
+  <p:extLst>
+    <p:ext uri="{EFAFB233-063F-42B5-8137-9DF3F51BA10A}">
+      <p15:sldGuideLst xmlns:p15="http://schemas.microsoft.com/office/powerpoint/2012/main"/>
+    </p:ext>
+  </p:extLst>
 </p:presentation>
 </file>
 
@@ -10126,7 +10131,7 @@
           <a:p>
             <a:fld id="{796FDD7A-9F38-4CDF-B347-1A5209BFD58B}" type="datetimeFigureOut">
               <a:rPr lang="en-IN" smtClean="0"/>
-              <a:t>19-02-2026</a:t>
+              <a:t>20-02-2026</a:t>
             </a:fld>
             <a:endParaRPr lang="en-IN"/>
           </a:p>
@@ -10422,6 +10427,13 @@
           </p:nvPr>
         </p:nvSpPr>
         <p:spPr/>
+        <p:txBody>
+          <a:bodyPr/>
+          <a:lstStyle/>
+          <a:p>
+            <a:endParaRPr lang="en-IN"/>
+          </a:p>
+        </p:txBody>
       </p:sp>
       <p:sp>
         <p:nvSpPr>
@@ -10627,7 +10639,7 @@
           <a:p>
             <a:fld id="{C1938870-312B-410B-A6B0-3A5B6A2B0AD3}" type="datetimeFigureOut">
               <a:rPr lang="en-IN" smtClean="0"/>
-              <a:t>19-02-2026</a:t>
+              <a:t>20-02-2026</a:t>
             </a:fld>
             <a:endParaRPr lang="en-IN"/>
           </a:p>
@@ -10827,7 +10839,7 @@
           <a:p>
             <a:fld id="{C1938870-312B-410B-A6B0-3A5B6A2B0AD3}" type="datetimeFigureOut">
               <a:rPr lang="en-IN" smtClean="0"/>
-              <a:t>19-02-2026</a:t>
+              <a:t>20-02-2026</a:t>
             </a:fld>
             <a:endParaRPr lang="en-IN"/>
           </a:p>
@@ -11037,7 +11049,7 @@
           <a:p>
             <a:fld id="{C1938870-312B-410B-A6B0-3A5B6A2B0AD3}" type="datetimeFigureOut">
               <a:rPr lang="en-IN" smtClean="0"/>
-              <a:t>19-02-2026</a:t>
+              <a:t>20-02-2026</a:t>
             </a:fld>
             <a:endParaRPr lang="en-IN"/>
           </a:p>
@@ -11237,7 +11249,7 @@
           <a:p>
             <a:fld id="{C1938870-312B-410B-A6B0-3A5B6A2B0AD3}" type="datetimeFigureOut">
               <a:rPr lang="en-IN" smtClean="0"/>
-              <a:t>19-02-2026</a:t>
+              <a:t>20-02-2026</a:t>
             </a:fld>
             <a:endParaRPr lang="en-IN"/>
           </a:p>
@@ -11513,7 +11525,7 @@
           <a:p>
             <a:fld id="{C1938870-312B-410B-A6B0-3A5B6A2B0AD3}" type="datetimeFigureOut">
               <a:rPr lang="en-IN" smtClean="0"/>
-              <a:t>19-02-2026</a:t>
+              <a:t>20-02-2026</a:t>
             </a:fld>
             <a:endParaRPr lang="en-IN"/>
           </a:p>
@@ -11781,7 +11793,7 @@
           <a:p>
             <a:fld id="{C1938870-312B-410B-A6B0-3A5B6A2B0AD3}" type="datetimeFigureOut">
               <a:rPr lang="en-IN" smtClean="0"/>
-              <a:t>19-02-2026</a:t>
+              <a:t>20-02-2026</a:t>
             </a:fld>
             <a:endParaRPr lang="en-IN"/>
           </a:p>
@@ -12196,7 +12208,7 @@
           <a:p>
             <a:fld id="{C1938870-312B-410B-A6B0-3A5B6A2B0AD3}" type="datetimeFigureOut">
               <a:rPr lang="en-IN" smtClean="0"/>
-              <a:t>19-02-2026</a:t>
+              <a:t>20-02-2026</a:t>
             </a:fld>
             <a:endParaRPr lang="en-IN"/>
           </a:p>
@@ -12338,7 +12350,7 @@
           <a:p>
             <a:fld id="{C1938870-312B-410B-A6B0-3A5B6A2B0AD3}" type="datetimeFigureOut">
               <a:rPr lang="en-IN" smtClean="0"/>
-              <a:t>19-02-2026</a:t>
+              <a:t>20-02-2026</a:t>
             </a:fld>
             <a:endParaRPr lang="en-IN"/>
           </a:p>
@@ -12451,7 +12463,7 @@
           <a:p>
             <a:fld id="{C1938870-312B-410B-A6B0-3A5B6A2B0AD3}" type="datetimeFigureOut">
               <a:rPr lang="en-IN" smtClean="0"/>
-              <a:t>19-02-2026</a:t>
+              <a:t>20-02-2026</a:t>
             </a:fld>
             <a:endParaRPr lang="en-IN"/>
           </a:p>
@@ -12764,7 +12776,7 @@
           <a:p>
             <a:fld id="{C1938870-312B-410B-A6B0-3A5B6A2B0AD3}" type="datetimeFigureOut">
               <a:rPr lang="en-IN" smtClean="0"/>
-              <a:t>19-02-2026</a:t>
+              <a:t>20-02-2026</a:t>
             </a:fld>
             <a:endParaRPr lang="en-IN"/>
           </a:p>
@@ -13053,7 +13065,7 @@
           <a:p>
             <a:fld id="{C1938870-312B-410B-A6B0-3A5B6A2B0AD3}" type="datetimeFigureOut">
               <a:rPr lang="en-IN" smtClean="0"/>
-              <a:t>19-02-2026</a:t>
+              <a:t>20-02-2026</a:t>
             </a:fld>
             <a:endParaRPr lang="en-IN"/>
           </a:p>
@@ -13296,7 +13308,7 @@
           <a:p>
             <a:fld id="{C1938870-312B-410B-A6B0-3A5B6A2B0AD3}" type="datetimeFigureOut">
               <a:rPr lang="en-IN" smtClean="0"/>
-              <a:t>19-02-2026</a:t>
+              <a:t>20-02-2026</a:t>
             </a:fld>
             <a:endParaRPr lang="en-IN"/>
           </a:p>
@@ -15439,7 +15451,17 @@
           <a:bodyPr/>
           <a:lstStyle/>
           <a:p>
-            <a:endParaRPr lang="en-IN"/>
+            <a:r>
+              <a:rPr lang="en-IN" b="1" dirty="0">
+                <a:solidFill>
+                  <a:schemeClr val="accent2">
+                    <a:lumMod val="60000"/>
+                    <a:lumOff val="40000"/>
+                  </a:schemeClr>
+                </a:solidFill>
+              </a:rPr>
+              <a:t>Standard Query Operators</a:t>
+            </a:r>
           </a:p>
         </p:txBody>
       </p:sp>
@@ -15464,7 +15486,117 @@
           <a:bodyPr/>
           <a:lstStyle/>
           <a:p>
-            <a:endParaRPr lang="en-IN"/>
+            <a:r>
+              <a:rPr lang="en-IN" dirty="0">
+                <a:solidFill>
+                  <a:schemeClr val="bg1">
+                    <a:lumMod val="95000"/>
+                  </a:schemeClr>
+                </a:solidFill>
+              </a:rPr>
+              <a:t>Filters</a:t>
+            </a:r>
+          </a:p>
+          <a:p>
+            <a:pPr lvl="1"/>
+            <a:r>
+              <a:rPr lang="en-IN" dirty="0">
+                <a:solidFill>
+                  <a:schemeClr val="bg1">
+                    <a:lumMod val="95000"/>
+                  </a:schemeClr>
+                </a:solidFill>
+              </a:rPr>
+              <a:t>Where</a:t>
+            </a:r>
+          </a:p>
+          <a:p>
+            <a:pPr lvl="1"/>
+            <a:r>
+              <a:rPr lang="en-IN" dirty="0">
+                <a:solidFill>
+                  <a:schemeClr val="bg1">
+                    <a:lumMod val="95000"/>
+                  </a:schemeClr>
+                </a:solidFill>
+              </a:rPr>
+              <a:t>TypeOf</a:t>
+            </a:r>
+          </a:p>
+          <a:p>
+            <a:r>
+              <a:rPr lang="en-IN" dirty="0">
+                <a:solidFill>
+                  <a:schemeClr val="bg1">
+                    <a:lumMod val="95000"/>
+                  </a:schemeClr>
+                </a:solidFill>
+              </a:rPr>
+              <a:t>Projection operations</a:t>
+            </a:r>
+          </a:p>
+          <a:p>
+            <a:pPr lvl="1"/>
+            <a:r>
+              <a:rPr lang="en-IN" dirty="0">
+                <a:solidFill>
+                  <a:schemeClr val="bg1">
+                    <a:lumMod val="95000"/>
+                  </a:schemeClr>
+                </a:solidFill>
+              </a:rPr>
+              <a:t>Select</a:t>
+            </a:r>
+          </a:p>
+          <a:p>
+            <a:pPr lvl="1"/>
+            <a:r>
+              <a:rPr lang="en-IN" dirty="0">
+                <a:solidFill>
+                  <a:schemeClr val="bg1">
+                    <a:lumMod val="95000"/>
+                  </a:schemeClr>
+                </a:solidFill>
+              </a:rPr>
+              <a:t>SelectMany</a:t>
+            </a:r>
+          </a:p>
+          <a:p>
+            <a:pPr lvl="1"/>
+            <a:r>
+              <a:rPr lang="en-IN" dirty="0">
+                <a:solidFill>
+                  <a:schemeClr val="bg1">
+                    <a:lumMod val="95000"/>
+                  </a:schemeClr>
+                </a:solidFill>
+              </a:rPr>
+              <a:t>Zip</a:t>
+            </a:r>
+          </a:p>
+          <a:p>
+            <a:r>
+              <a:rPr lang="en-IN" dirty="0">
+                <a:solidFill>
+                  <a:schemeClr val="bg1">
+                    <a:lumMod val="95000"/>
+                  </a:schemeClr>
+                </a:solidFill>
+              </a:rPr>
+              <a:t>Set Operations</a:t>
+            </a:r>
+          </a:p>
+          <a:p>
+            <a:r>
+              <a:rPr lang="en-IN" dirty="0">
+                <a:solidFill>
+                  <a:schemeClr val="bg1">
+                    <a:lumMod val="95000"/>
+                  </a:schemeClr>
+                </a:solidFill>
+              </a:rPr>
+              <a:t>Sorting Data</a:t>
+            </a:r>
           </a:p>
         </p:txBody>
       </p:sp>

</xml_diff>